<commit_message>
Second group exercise in data-viz-03
</commit_message>
<xml_diff>
--- a/data-viz-03/src/data-visualization-03-lines.pptx
+++ b/data-viz-03/src/data-visualization-03-lines.pptx
@@ -5,7 +5,7 @@
     <p:sldMasterId id="2147483648" r:id="rId1"/>
   </p:sldMasterIdLst>
   <p:notesMasterIdLst>
-    <p:NotesMasterId r:id="rId50"/>
+    <p:NotesMasterId r:id="rId47"/>
   </p:notesMasterIdLst>
   <p:sldIdLst>
     <p:sldId id="256" r:id="rId2"/>
@@ -53,9 +53,6 @@
     <p:sldId id="298" r:id="rId44"/>
     <p:sldId id="299" r:id="rId45"/>
     <p:sldId id="300" r:id="rId46"/>
-    <p:sldId id="301" r:id="rId47"/>
-    <p:sldId id="302" r:id="rId48"/>
-    <p:sldId id="303" r:id="rId49"/>
   </p:sldIdLst>
   <p:sldSz cx="9144000" cy="6858000" type="screen4x3"/>
   <p:notesSz cx="6858000" cy="9144000"/>
@@ -1330,6 +1327,276 @@
 </file>
 
 <file path=ppt/notesSlides/notesSlide2.xml><?xml version="1.0" encoding="utf-8"?>
+<p:notes xmlns:a="http://schemas.openxmlformats.org/drawingml/2006/main" xmlns:r="http://schemas.openxmlformats.org/officeDocument/2006/relationships" xmlns:p="http://schemas.openxmlformats.org/presentationml/2006/main">
+  <p:cSld>
+    <p:spTree>
+      <p:nvGrpSpPr>
+        <p:cNvPr id="1" name=""/>
+        <p:cNvGrpSpPr/>
+        <p:nvPr/>
+      </p:nvGrpSpPr>
+      <p:grpSpPr>
+        <a:xfrm>
+          <a:off x="0" y="0"/>
+          <a:ext cx="0" cy="0"/>
+          <a:chOff x="0" y="0"/>
+          <a:chExt cx="0" cy="0"/>
+        </a:xfrm>
+      </p:grpSpPr>
+      <p:sp>
+        <p:nvSpPr>
+          <p:cNvPr id="2" name="Slide Image Placeholder 1"/>
+          <p:cNvSpPr>
+            <a:spLocks noGrp="1" noRot="1" noChangeAspect="1"/>
+          </p:cNvSpPr>
+          <p:nvPr>
+            <p:ph type="sldImg"/>
+          </p:nvPr>
+        </p:nvSpPr>
+        <p:spPr/>
+      </p:sp>
+      <p:sp>
+        <p:nvSpPr>
+          <p:cNvPr id="3" name="Notes Placeholder 2"/>
+          <p:cNvSpPr>
+            <a:spLocks noGrp="1"/>
+          </p:cNvSpPr>
+          <p:nvPr>
+            <p:ph type="body" idx="1"/>
+          </p:nvPr>
+        </p:nvSpPr>
+        <p:spPr/>
+        <p:txBody>
+          <a:bodyPr/>
+          <a:lstStyle/>
+          <a:p>
+            <a:pPr lvl="0" marL="0" indent="0">
+              <a:buNone/>
+            </a:pPr>
+            <a:r>
+              <a:rPr/>
+              <a:t>Aaron</a:t>
+            </a:r>
+            <a:r>
+              <a:rPr/>
+              <a:t> </a:t>
+            </a:r>
+            <a:r>
+              <a:rPr/>
+              <a:t>Smith,</a:t>
+            </a:r>
+            <a:r>
+              <a:rPr/>
+              <a:t> </a:t>
+            </a:r>
+            <a:r>
+              <a:rPr/>
+              <a:t>Record</a:t>
+            </a:r>
+            <a:r>
+              <a:rPr/>
+              <a:t> </a:t>
+            </a:r>
+            <a:r>
+              <a:rPr/>
+              <a:t>shares</a:t>
+            </a:r>
+            <a:r>
+              <a:rPr/>
+              <a:t> </a:t>
+            </a:r>
+            <a:r>
+              <a:rPr/>
+              <a:t>of</a:t>
+            </a:r>
+            <a:r>
+              <a:rPr/>
+              <a:t> </a:t>
+            </a:r>
+            <a:r>
+              <a:rPr/>
+              <a:t>Americans</a:t>
+            </a:r>
+            <a:r>
+              <a:rPr/>
+              <a:t> </a:t>
+            </a:r>
+            <a:r>
+              <a:rPr/>
+              <a:t>now</a:t>
+            </a:r>
+            <a:r>
+              <a:rPr/>
+              <a:t> </a:t>
+            </a:r>
+            <a:r>
+              <a:rPr/>
+              <a:t>own</a:t>
+            </a:r>
+            <a:r>
+              <a:rPr/>
+              <a:t> </a:t>
+            </a:r>
+            <a:r>
+              <a:rPr/>
+              <a:t>smartphones,</a:t>
+            </a:r>
+            <a:r>
+              <a:rPr/>
+              <a:t> </a:t>
+            </a:r>
+            <a:r>
+              <a:rPr/>
+              <a:t>have</a:t>
+            </a:r>
+            <a:r>
+              <a:rPr/>
+              <a:t> </a:t>
+            </a:r>
+            <a:r>
+              <a:rPr/>
+              <a:t>home</a:t>
+            </a:r>
+            <a:r>
+              <a:rPr/>
+              <a:t> </a:t>
+            </a:r>
+            <a:r>
+              <a:rPr/>
+              <a:t>broadband.</a:t>
+            </a:r>
+            <a:r>
+              <a:rPr/>
+              <a:t> </a:t>
+            </a:r>
+            <a:r>
+              <a:rPr/>
+              <a:t>Pew</a:t>
+            </a:r>
+            <a:r>
+              <a:rPr/>
+              <a:t> </a:t>
+            </a:r>
+            <a:r>
+              <a:rPr/>
+              <a:t>Research</a:t>
+            </a:r>
+            <a:r>
+              <a:rPr/>
+              <a:t> </a:t>
+            </a:r>
+            <a:r>
+              <a:rPr/>
+              <a:t>Center,</a:t>
+            </a:r>
+            <a:r>
+              <a:rPr/>
+              <a:t> </a:t>
+            </a:r>
+            <a:r>
+              <a:rPr/>
+              <a:t>January</a:t>
+            </a:r>
+            <a:r>
+              <a:rPr/>
+              <a:t> </a:t>
+            </a:r>
+            <a:r>
+              <a:rPr/>
+              <a:t>12,</a:t>
+            </a:r>
+            <a:r>
+              <a:rPr/>
+              <a:t> </a:t>
+            </a:r>
+            <a:r>
+              <a:rPr/>
+              <a:t>2017.</a:t>
+            </a:r>
+            <a:r>
+              <a:rPr/>
+              <a:t> </a:t>
+            </a:r>
+            <a:r>
+              <a:rPr/>
+              <a:t>Retrived</a:t>
+            </a:r>
+            <a:r>
+              <a:rPr/>
+              <a:t> </a:t>
+            </a:r>
+            <a:r>
+              <a:rPr/>
+              <a:t>August</a:t>
+            </a:r>
+            <a:r>
+              <a:rPr/>
+              <a:t> </a:t>
+            </a:r>
+            <a:r>
+              <a:rPr/>
+              <a:t>14,</a:t>
+            </a:r>
+            <a:r>
+              <a:rPr/>
+              <a:t> </a:t>
+            </a:r>
+            <a:r>
+              <a:rPr/>
+              <a:t>2019</a:t>
+            </a:r>
+            <a:r>
+              <a:rPr/>
+              <a:t> </a:t>
+            </a:r>
+            <a:r>
+              <a:rPr/>
+              <a:t>from</a:t>
+            </a:r>
+            <a:r>
+              <a:rPr/>
+              <a:t> </a:t>
+            </a:r>
+            <a:r>
+              <a:rPr/>
+              <a:t>https://www.pewresearch.org/fact-tank/2017/01/12/evolution-of-technology/</a:t>
+            </a:r>
+            <a:r>
+              <a:rPr/>
+              <a:t>.</a:t>
+            </a:r>
+          </a:p>
+        </p:txBody>
+      </p:sp>
+      <p:sp>
+        <p:nvSpPr>
+          <p:cNvPr id="4" name="Slide Number Placeholder 3"/>
+          <p:cNvSpPr>
+            <a:spLocks noGrp="1"/>
+          </p:cNvSpPr>
+          <p:nvPr>
+            <p:ph type="sldNum" sz="quarter" idx="10"/>
+          </p:nvPr>
+        </p:nvSpPr>
+        <p:spPr/>
+        <p:txBody>
+          <a:bodyPr/>
+          <a:lstStyle/>
+          <a:p>
+            <a:fld id="{18BDFEC3-8487-43E8-A154-7C12CBC1FFF2}" type="slidenum">
+              <a:rPr lang="en-US"/>
+              <a:t>9</a:t>
+            </a:fld>
+            <a:endParaRPr lang="en-US"/>
+          </a:p>
+        </p:txBody>
+      </p:sp>
+    </p:spTree>
+  </p:cSld>
+</p:notes>
+</file>
+
+<file path=ppt/notesSlides/notesSlide3.xml><?xml version="1.0" encoding="utf-8"?>
 <p:notes xmlns:a="http://schemas.openxmlformats.org/drawingml/2006/main" xmlns:r="http://schemas.openxmlformats.org/officeDocument/2006/relationships" xmlns:p="http://schemas.openxmlformats.org/presentationml/2006/main">
   <p:cSld>
     <p:spTree>
@@ -5210,7 +5477,7 @@
       </p:sp>
       <p:pic>
         <p:nvPicPr>
-          <p:cNvPr descr="data-visualization-03-lines_files/figure-pptx/block-no-emphasis-1.png" id="0" name="Picture 1"/>
+          <p:cNvPr descr="../images/block-no-emphasis.png" id="0" name="Picture 1"/>
           <p:cNvPicPr>
             <a:picLocks noGrp="1" noChangeAspect="1"/>
           </p:cNvPicPr>
@@ -5224,8 +5491,8 @@
         </p:blipFill>
         <p:spPr bwMode="auto">
           <a:xfrm>
-            <a:off x="1752600" y="1600200"/>
-            <a:ext cx="5651500" cy="4521200"/>
+            <a:off x="2311400" y="1600200"/>
+            <a:ext cx="4521200" cy="4521200"/>
           </a:xfrm>
           <a:prstGeom prst="rect">
             <a:avLst/>
@@ -5303,7 +5570,7 @@
       </p:sp>
       <p:pic>
         <p:nvPicPr>
-          <p:cNvPr descr="data-visualization-03-lines_files/figure-pptx/block-color-1.png" id="0" name="Picture 1"/>
+          <p:cNvPr descr="../images/block-color.png" id="0" name="Picture 1"/>
           <p:cNvPicPr>
             <a:picLocks noGrp="1" noChangeAspect="1"/>
           </p:cNvPicPr>
@@ -5317,8 +5584,8 @@
         </p:blipFill>
         <p:spPr bwMode="auto">
           <a:xfrm>
-            <a:off x="1752600" y="1600200"/>
-            <a:ext cx="5651500" cy="4521200"/>
+            <a:off x="2311400" y="1600200"/>
+            <a:ext cx="4521200" cy="4521200"/>
           </a:xfrm>
           <a:prstGeom prst="rect">
             <a:avLst/>
@@ -5396,7 +5663,7 @@
       </p:sp>
       <p:pic>
         <p:nvPicPr>
-          <p:cNvPr descr="data-visualization-03-lines_files/figure-pptx/block-shape-1.png" id="0" name="Picture 1"/>
+          <p:cNvPr descr="../images/block-shape.png" id="0" name="Picture 1"/>
           <p:cNvPicPr>
             <a:picLocks noGrp="1" noChangeAspect="1"/>
           </p:cNvPicPr>
@@ -5410,8 +5677,8 @@
         </p:blipFill>
         <p:spPr bwMode="auto">
           <a:xfrm>
-            <a:off x="1752600" y="1600200"/>
-            <a:ext cx="5651500" cy="4521200"/>
+            <a:off x="2311400" y="1600200"/>
+            <a:ext cx="4521200" cy="4521200"/>
           </a:xfrm>
           <a:prstGeom prst="rect">
             <a:avLst/>
@@ -5505,7 +5772,7 @@
       </p:sp>
       <p:pic>
         <p:nvPicPr>
-          <p:cNvPr descr="data-visualization-03-lines_files/figure-pptx/block-double-up-1.png" id="0" name="Picture 1"/>
+          <p:cNvPr descr="../images/block-double-up.png" id="0" name="Picture 1"/>
           <p:cNvPicPr>
             <a:picLocks noGrp="1" noChangeAspect="1"/>
           </p:cNvPicPr>
@@ -5519,8 +5786,8 @@
         </p:blipFill>
         <p:spPr bwMode="auto">
           <a:xfrm>
-            <a:off x="1752600" y="1600200"/>
-            <a:ext cx="5651500" cy="4521200"/>
+            <a:off x="2311400" y="1600200"/>
+            <a:ext cx="4521200" cy="4521200"/>
           </a:xfrm>
           <a:prstGeom prst="rect">
             <a:avLst/>
@@ -5598,7 +5865,7 @@
       </p:sp>
       <p:pic>
         <p:nvPicPr>
-          <p:cNvPr descr="data-visualization-03-lines_files/figure-pptx/block-connectedness-1.png" id="0" name="Picture 1"/>
+          <p:cNvPr descr="../images/block-connectedness.png" id="0" name="Picture 1"/>
           <p:cNvPicPr>
             <a:picLocks noGrp="1" noChangeAspect="1"/>
           </p:cNvPicPr>
@@ -5612,8 +5879,8 @@
         </p:blipFill>
         <p:spPr bwMode="auto">
           <a:xfrm>
-            <a:off x="1752600" y="1600200"/>
-            <a:ext cx="5651500" cy="4521200"/>
+            <a:off x="2311400" y="1600200"/>
+            <a:ext cx="4521200" cy="4521200"/>
           </a:xfrm>
           <a:prstGeom prst="rect">
             <a:avLst/>
@@ -5691,7 +5958,7 @@
       </p:sp>
       <p:pic>
         <p:nvPicPr>
-          <p:cNvPr descr="data-visualization-03-lines_files/figure-pptx/block-proximity-1.png" id="0" name="Picture 1"/>
+          <p:cNvPr descr="../images/block-proximity.png" id="0" name="Picture 1"/>
           <p:cNvPicPr>
             <a:picLocks noGrp="1" noChangeAspect="1"/>
           </p:cNvPicPr>
@@ -5705,8 +5972,8 @@
         </p:blipFill>
         <p:spPr bwMode="auto">
           <a:xfrm>
-            <a:off x="1752600" y="1600200"/>
-            <a:ext cx="5651500" cy="4521200"/>
+            <a:off x="2311400" y="1600200"/>
+            <a:ext cx="4521200" cy="4521200"/>
           </a:xfrm>
           <a:prstGeom prst="rect">
             <a:avLst/>
@@ -5808,7 +6075,7 @@
       </p:sp>
       <p:pic>
         <p:nvPicPr>
-          <p:cNvPr descr="data-visualization-03-lines_files/figure-pptx/block-enclosure-1.png" id="0" name="Picture 1"/>
+          <p:cNvPr descr="../images/block-enclosure.png" id="0" name="Picture 1"/>
           <p:cNvPicPr>
             <a:picLocks noGrp="1" noChangeAspect="1"/>
           </p:cNvPicPr>
@@ -5822,8 +6089,8 @@
         </p:blipFill>
         <p:spPr bwMode="auto">
           <a:xfrm>
-            <a:off x="1752600" y="1600200"/>
-            <a:ext cx="5651500" cy="4521200"/>
+            <a:off x="2311400" y="1600200"/>
+            <a:ext cx="4521200" cy="4521200"/>
           </a:xfrm>
           <a:prstGeom prst="rect">
             <a:avLst/>
@@ -6324,7 +6591,7 @@
       </p:sp>
       <p:pic>
         <p:nvPicPr>
-          <p:cNvPr descr="data-visualization-03-lines_files/figure-pptx/line-size-1.png" id="0" name="Picture 1"/>
+          <p:cNvPr descr="../images/line-size.png" id="0" name="Picture 1"/>
           <p:cNvPicPr>
             <a:picLocks noGrp="1" noChangeAspect="1"/>
           </p:cNvPicPr>
@@ -6338,8 +6605,8 @@
         </p:blipFill>
         <p:spPr bwMode="auto">
           <a:xfrm>
-            <a:off x="1752600" y="1600200"/>
-            <a:ext cx="5651500" cy="4521200"/>
+            <a:off x="2311400" y="1600200"/>
+            <a:ext cx="4521200" cy="4521200"/>
           </a:xfrm>
           <a:prstGeom prst="rect">
             <a:avLst/>
@@ -6401,7 +6668,7 @@
       </p:sp>
       <p:pic>
         <p:nvPicPr>
-          <p:cNvPr descr="data-visualization-03-lines_files/figure-pptx/line-shape-1.png" id="0" name="Picture 1"/>
+          <p:cNvPr descr="../images/line-shape.png" id="0" name="Picture 1"/>
           <p:cNvPicPr>
             <a:picLocks noGrp="1" noChangeAspect="1"/>
           </p:cNvPicPr>
@@ -6415,8 +6682,8 @@
         </p:blipFill>
         <p:spPr bwMode="auto">
           <a:xfrm>
-            <a:off x="1752600" y="1600200"/>
-            <a:ext cx="5651500" cy="4521200"/>
+            <a:off x="2311400" y="1600200"/>
+            <a:ext cx="4521200" cy="4521200"/>
           </a:xfrm>
           <a:prstGeom prst="rect">
             <a:avLst/>
@@ -6728,7 +6995,7 @@
       </p:sp>
       <p:pic>
         <p:nvPicPr>
-          <p:cNvPr descr="data-visualization-03-lines_files/figure-pptx/width-shape-color-1.png" id="0" name="Picture 1"/>
+          <p:cNvPr descr="../images/width-shape-color.png" id="0" name="Picture 1"/>
           <p:cNvPicPr>
             <a:picLocks noGrp="1" noChangeAspect="1"/>
           </p:cNvPicPr>
@@ -6742,8 +7009,8 @@
         </p:blipFill>
         <p:spPr bwMode="auto">
           <a:xfrm>
-            <a:off x="1752600" y="1600200"/>
-            <a:ext cx="5651500" cy="4521200"/>
+            <a:off x="2311400" y="1600200"/>
+            <a:ext cx="4521200" cy="4521200"/>
           </a:xfrm>
           <a:prstGeom prst="rect">
             <a:avLst/>
@@ -6780,12 +7047,12 @@
       </p:grpSpPr>
       <p:sp>
         <p:nvSpPr>
-          <p:cNvPr id="3" name="Content Placeholder 2"/>
-          <p:cNvSpPr>
-            <a:spLocks noGrp="1"/>
-          </p:cNvSpPr>
-          <p:nvPr>
-            <p:ph idx="1"/>
+          <p:cNvPr id="2" name="Title 1"/>
+          <p:cNvSpPr>
+            <a:spLocks noGrp="1"/>
+          </p:cNvSpPr>
+          <p:nvPr>
+            <p:ph type="title"/>
           </p:nvPr>
         </p:nvSpPr>
         <p:spPr/>
@@ -6798,11 +7065,65 @@
             </a:pPr>
             <a:r>
               <a:rPr/>
-              <a:t> ### Lines as summary statistics</a:t>
-            </a:r>
-          </a:p>
-        </p:txBody>
-      </p:sp>
+              <a:t>Lines</a:t>
+            </a:r>
+            <a:r>
+              <a:rPr/>
+              <a:t> </a:t>
+            </a:r>
+            <a:r>
+              <a:rPr/>
+              <a:t>as</a:t>
+            </a:r>
+            <a:r>
+              <a:rPr/>
+              <a:t> </a:t>
+            </a:r>
+            <a:r>
+              <a:rPr/>
+              <a:t>summary</a:t>
+            </a:r>
+            <a:r>
+              <a:rPr/>
+              <a:t> </a:t>
+            </a:r>
+            <a:r>
+              <a:rPr/>
+              <a:t>statistics</a:t>
+            </a:r>
+          </a:p>
+        </p:txBody>
+      </p:sp>
+      <p:pic>
+        <p:nvPicPr>
+          <p:cNvPr descr="../images/old-friend.png" id="0" name="Picture 1"/>
+          <p:cNvPicPr>
+            <a:picLocks noGrp="1" noChangeAspect="1"/>
+          </p:cNvPicPr>
+          <p:nvPr/>
+        </p:nvPicPr>
+        <p:blipFill>
+          <a:blip r:embed="rId2"/>
+          <a:stretch>
+            <a:fillRect/>
+          </a:stretch>
+        </p:blipFill>
+        <p:spPr bwMode="auto">
+          <a:xfrm>
+            <a:off x="2311400" y="1600200"/>
+            <a:ext cx="4521200" cy="4521200"/>
+          </a:xfrm>
+          <a:prstGeom prst="rect">
+            <a:avLst/>
+          </a:prstGeom>
+          <a:noFill/>
+          <a:ln w="9525">
+            <a:noFill/>
+            <a:headEnd/>
+            <a:tailEnd/>
+          </a:ln>
+        </p:spPr>
+      </p:pic>
     </p:spTree>
   </p:cSld>
 </p:sld>
@@ -6825,9 +7146,50 @@
           <a:chExt cx="0" cy="0"/>
         </a:xfrm>
       </p:grpSpPr>
+      <p:sp>
+        <p:nvSpPr>
+          <p:cNvPr id="2" name="Title 1"/>
+          <p:cNvSpPr>
+            <a:spLocks noGrp="1"/>
+          </p:cNvSpPr>
+          <p:nvPr>
+            <p:ph type="title"/>
+          </p:nvPr>
+        </p:nvSpPr>
+        <p:spPr/>
+        <p:txBody>
+          <a:bodyPr/>
+          <a:lstStyle/>
+          <a:p>
+            <a:pPr lvl="0" marL="0" indent="0">
+              <a:buNone/>
+            </a:pPr>
+            <a:r>
+              <a:rPr/>
+              <a:t>Lines</a:t>
+            </a:r>
+            <a:r>
+              <a:rPr/>
+              <a:t> </a:t>
+            </a:r>
+            <a:r>
+              <a:rPr/>
+              <a:t>as</a:t>
+            </a:r>
+            <a:r>
+              <a:rPr/>
+              <a:t> </a:t>
+            </a:r>
+            <a:r>
+              <a:rPr/>
+              <a:t>averages</a:t>
+            </a:r>
+          </a:p>
+        </p:txBody>
+      </p:sp>
       <p:pic>
         <p:nvPicPr>
-          <p:cNvPr descr="data-visualization-03-lines_files/figure-pptx/old-friend-1.png" id="0" name="Picture 1"/>
+          <p:cNvPr descr="../images/average.png" id="0" name="Picture 1"/>
           <p:cNvPicPr>
             <a:picLocks noGrp="1" noChangeAspect="1"/>
           </p:cNvPicPr>
@@ -6841,8 +7203,8 @@
         </p:blipFill>
         <p:spPr bwMode="auto">
           <a:xfrm>
-            <a:off x="1752600" y="1600200"/>
-            <a:ext cx="5651500" cy="4521200"/>
+            <a:off x="2311400" y="1600200"/>
+            <a:ext cx="4521200" cy="4521200"/>
           </a:xfrm>
           <a:prstGeom prst="rect">
             <a:avLst/>
@@ -6879,12 +7241,12 @@
       </p:grpSpPr>
       <p:sp>
         <p:nvSpPr>
-          <p:cNvPr id="3" name="Content Placeholder 2"/>
-          <p:cNvSpPr>
-            <a:spLocks noGrp="1"/>
-          </p:cNvSpPr>
-          <p:nvPr>
-            <p:ph idx="1"/>
+          <p:cNvPr id="2" name="Title 1"/>
+          <p:cNvSpPr>
+            <a:spLocks noGrp="1"/>
+          </p:cNvSpPr>
+          <p:nvPr>
+            <p:ph type="title"/>
           </p:nvPr>
         </p:nvSpPr>
         <p:spPr/>
@@ -6897,11 +7259,57 @@
             </a:pPr>
             <a:r>
               <a:rPr/>
-              <a:t> ### Lines as averages</a:t>
-            </a:r>
-          </a:p>
-        </p:txBody>
-      </p:sp>
+              <a:t>Lines</a:t>
+            </a:r>
+            <a:r>
+              <a:rPr/>
+              <a:t> </a:t>
+            </a:r>
+            <a:r>
+              <a:rPr/>
+              <a:t>as</a:t>
+            </a:r>
+            <a:r>
+              <a:rPr/>
+              <a:t> </a:t>
+            </a:r>
+            <a:r>
+              <a:rPr/>
+              <a:t>counts</a:t>
+            </a:r>
+          </a:p>
+        </p:txBody>
+      </p:sp>
+      <p:pic>
+        <p:nvPicPr>
+          <p:cNvPr descr="../images/count.png" id="0" name="Picture 1"/>
+          <p:cNvPicPr>
+            <a:picLocks noGrp="1" noChangeAspect="1"/>
+          </p:cNvPicPr>
+          <p:nvPr/>
+        </p:nvPicPr>
+        <p:blipFill>
+          <a:blip r:embed="rId2"/>
+          <a:stretch>
+            <a:fillRect/>
+          </a:stretch>
+        </p:blipFill>
+        <p:spPr bwMode="auto">
+          <a:xfrm>
+            <a:off x="2311400" y="1600200"/>
+            <a:ext cx="4521200" cy="4521200"/>
+          </a:xfrm>
+          <a:prstGeom prst="rect">
+            <a:avLst/>
+          </a:prstGeom>
+          <a:noFill/>
+          <a:ln w="9525">
+            <a:noFill/>
+            <a:headEnd/>
+            <a:tailEnd/>
+          </a:ln>
+        </p:spPr>
+      </p:pic>
     </p:spTree>
   </p:cSld>
 </p:sld>
@@ -7032,36 +7440,70 @@
           <a:chExt cx="0" cy="0"/>
         </a:xfrm>
       </p:grpSpPr>
-      <p:pic>
-        <p:nvPicPr>
-          <p:cNvPr descr="data-visualization-03-lines_files/figure-pptx/average-1.png" id="0" name="Picture 1"/>
-          <p:cNvPicPr>
-            <a:picLocks noGrp="1" noChangeAspect="1"/>
-          </p:cNvPicPr>
-          <p:nvPr/>
-        </p:nvPicPr>
-        <p:blipFill>
-          <a:blip r:embed="rId2"/>
-          <a:stretch>
-            <a:fillRect/>
-          </a:stretch>
-        </p:blipFill>
-        <p:spPr bwMode="auto">
-          <a:xfrm>
-            <a:off x="1752600" y="1600200"/>
-            <a:ext cx="5651500" cy="4521200"/>
-          </a:xfrm>
-          <a:prstGeom prst="rect">
-            <a:avLst/>
-          </a:prstGeom>
-          <a:noFill/>
-          <a:ln w="9525">
-            <a:noFill/>
-            <a:headEnd/>
-            <a:tailEnd/>
-          </a:ln>
-        </p:spPr>
-      </p:pic>
+      <p:sp>
+        <p:nvSpPr>
+          <p:cNvPr id="2" name="Title 1"/>
+          <p:cNvSpPr>
+            <a:spLocks noGrp="1"/>
+          </p:cNvSpPr>
+          <p:nvPr>
+            <p:ph type="title"/>
+          </p:nvPr>
+        </p:nvSpPr>
+        <p:spPr/>
+        <p:txBody>
+          <a:bodyPr/>
+          <a:lstStyle/>
+          <a:p>
+            <a:pPr lvl="0" marL="0" indent="0">
+              <a:buNone/>
+            </a:pPr>
+            <a:r>
+              <a:rPr/>
+              <a:t>On</a:t>
+            </a:r>
+            <a:r>
+              <a:rPr/>
+              <a:t> </a:t>
+            </a:r>
+            <a:r>
+              <a:rPr/>
+              <a:t>your</a:t>
+            </a:r>
+            <a:r>
+              <a:rPr/>
+              <a:t> </a:t>
+            </a:r>
+            <a:r>
+              <a:rPr/>
+              <a:t>own</a:t>
+            </a:r>
+          </a:p>
+        </p:txBody>
+      </p:sp>
+      <p:sp>
+        <p:nvSpPr>
+          <p:cNvPr id="3" name="Content Placeholder 2"/>
+          <p:cNvSpPr>
+            <a:spLocks noGrp="1"/>
+          </p:cNvSpPr>
+          <p:nvPr>
+            <p:ph idx="1"/>
+          </p:nvPr>
+        </p:nvSpPr>
+        <p:spPr/>
+        <p:txBody>
+          <a:bodyPr/>
+          <a:lstStyle/>
+          <a:p>
+            <a:pPr lvl="1"/>
+            <a:r>
+              <a:rPr/>
+              <a:t>Draw a line graph showing the relationship between the number of bathrooms and price.</a:t>
+            </a:r>
+          </a:p>
+        </p:txBody>
+      </p:sp>
     </p:spTree>
   </p:cSld>
 </p:sld>
@@ -7104,57 +7546,52 @@
             </a:pPr>
             <a:r>
               <a:rPr/>
-              <a:t>Lines</a:t>
-            </a:r>
-            <a:r>
-              <a:rPr/>
-              <a:t> </a:t>
-            </a:r>
-            <a:r>
-              <a:rPr/>
-              <a:t>as</a:t>
-            </a:r>
-            <a:r>
-              <a:rPr/>
-              <a:t> </a:t>
-            </a:r>
-            <a:r>
-              <a:rPr/>
-              <a:t>counts</a:t>
-            </a:r>
-          </a:p>
-        </p:txBody>
-      </p:sp>
-      <p:pic>
-        <p:nvPicPr>
-          <p:cNvPr descr="data-visualization-03-lines_files/figure-pptx/count-1.png" id="0" name="Picture 1"/>
-          <p:cNvPicPr>
-            <a:picLocks noGrp="1" noChangeAspect="1"/>
-          </p:cNvPicPr>
-          <p:nvPr/>
-        </p:nvPicPr>
-        <p:blipFill>
-          <a:blip r:embed="rId2"/>
-          <a:stretch>
-            <a:fillRect/>
-          </a:stretch>
-        </p:blipFill>
-        <p:spPr bwMode="auto">
-          <a:xfrm>
-            <a:off x="1752600" y="1600200"/>
-            <a:ext cx="5651500" cy="4521200"/>
-          </a:xfrm>
-          <a:prstGeom prst="rect">
-            <a:avLst/>
-          </a:prstGeom>
-          <a:noFill/>
-          <a:ln w="9525">
-            <a:noFill/>
-            <a:headEnd/>
-            <a:tailEnd/>
-          </a:ln>
-        </p:spPr>
-      </p:pic>
+              <a:t>Wait</a:t>
+            </a:r>
+            <a:r>
+              <a:rPr/>
+              <a:t> </a:t>
+            </a:r>
+            <a:r>
+              <a:rPr/>
+              <a:t>before</a:t>
+            </a:r>
+            <a:r>
+              <a:rPr/>
+              <a:t> </a:t>
+            </a:r>
+            <a:r>
+              <a:rPr/>
+              <a:t>showing</a:t>
+            </a:r>
+          </a:p>
+        </p:txBody>
+      </p:sp>
+      <p:sp>
+        <p:nvSpPr>
+          <p:cNvPr id="3" name="Content Placeholder 2"/>
+          <p:cNvSpPr>
+            <a:spLocks noGrp="1"/>
+          </p:cNvSpPr>
+          <p:nvPr>
+            <p:ph idx="1"/>
+          </p:nvPr>
+        </p:nvSpPr>
+        <p:spPr/>
+        <p:txBody>
+          <a:bodyPr/>
+          <a:lstStyle/>
+          <a:p>
+            <a:pPr lvl="0" marL="0" indent="0">
+              <a:buNone/>
+            </a:pPr>
+            <a:r>
+              <a:rPr/>
+              <a:t>((Add code here))</a:t>
+            </a:r>
+          </a:p>
+        </p:txBody>
+      </p:sp>
     </p:spTree>
   </p:cSld>
 </p:sld>
@@ -7197,7 +7634,7 @@
             </a:pPr>
             <a:r>
               <a:rPr/>
-              <a:t>On</a:t>
+              <a:t>What</a:t>
             </a:r>
             <a:r>
               <a:rPr/>
@@ -7213,7 +7650,31 @@
             </a:r>
             <a:r>
               <a:rPr/>
-              <a:t>own</a:t>
+              <a:t>visualization</a:t>
+            </a:r>
+            <a:r>
+              <a:rPr/>
+              <a:t> </a:t>
+            </a:r>
+            <a:r>
+              <a:rPr/>
+              <a:t>might</a:t>
+            </a:r>
+            <a:r>
+              <a:rPr/>
+              <a:t> </a:t>
+            </a:r>
+            <a:r>
+              <a:rPr/>
+              <a:t>look</a:t>
+            </a:r>
+            <a:r>
+              <a:rPr/>
+              <a:t> </a:t>
+            </a:r>
+            <a:r>
+              <a:rPr/>
+              <a:t>like</a:t>
             </a:r>
           </a:p>
         </p:txBody>
@@ -7233,10 +7694,12 @@
           <a:bodyPr/>
           <a:lstStyle/>
           <a:p>
-            <a:pPr lvl="1"/>
-            <a:r>
-              <a:rPr/>
-              <a:t>Draw a line graph showing the relationship between the number of bathrooms and price.</a:t>
+            <a:pPr lvl="0" marL="0" indent="0">
+              <a:buNone/>
+            </a:pPr>
+            <a:r>
+              <a:rPr/>
+              <a:t>((Add visualization here))</a:t>
             </a:r>
           </a:p>
         </p:txBody>
@@ -7283,23 +7746,7 @@
             </a:pPr>
             <a:r>
               <a:rPr/>
-              <a:t>Wait</a:t>
-            </a:r>
-            <a:r>
-              <a:rPr/>
-              <a:t> </a:t>
-            </a:r>
-            <a:r>
-              <a:rPr/>
-              <a:t>before</a:t>
-            </a:r>
-            <a:r>
-              <a:rPr/>
-              <a:t> </a:t>
-            </a:r>
-            <a:r>
-              <a:rPr/>
-              <a:t>showing</a:t>
+              <a:t>Boxplots</a:t>
             </a:r>
           </a:p>
         </p:txBody>
@@ -7324,7 +7771,7 @@
             </a:pPr>
             <a:r>
               <a:rPr/>
-              <a:t>((Add code here))</a:t>
+              <a:t>((Draw example and ask students to do a similar example))</a:t>
             </a:r>
           </a:p>
         </p:txBody>
@@ -7371,76 +7818,57 @@
             </a:pPr>
             <a:r>
               <a:rPr/>
-              <a:t>What</a:t>
-            </a:r>
-            <a:r>
-              <a:rPr/>
-              <a:t> </a:t>
-            </a:r>
-            <a:r>
-              <a:rPr/>
-              <a:t>your</a:t>
-            </a:r>
-            <a:r>
-              <a:rPr/>
-              <a:t> </a:t>
-            </a:r>
-            <a:r>
-              <a:rPr/>
-              <a:t>visualization</a:t>
-            </a:r>
-            <a:r>
-              <a:rPr/>
-              <a:t> </a:t>
-            </a:r>
-            <a:r>
-              <a:rPr/>
-              <a:t>might</a:t>
-            </a:r>
-            <a:r>
-              <a:rPr/>
-              <a:t> </a:t>
-            </a:r>
-            <a:r>
-              <a:rPr/>
-              <a:t>look</a:t>
-            </a:r>
-            <a:r>
-              <a:rPr/>
-              <a:t> </a:t>
-            </a:r>
-            <a:r>
-              <a:rPr/>
-              <a:t>like</a:t>
-            </a:r>
-          </a:p>
-        </p:txBody>
-      </p:sp>
-      <p:sp>
-        <p:nvSpPr>
-          <p:cNvPr id="3" name="Content Placeholder 2"/>
-          <p:cNvSpPr>
-            <a:spLocks noGrp="1"/>
-          </p:cNvSpPr>
-          <p:nvPr>
-            <p:ph idx="1"/>
-          </p:nvPr>
-        </p:nvSpPr>
-        <p:spPr/>
-        <p:txBody>
-          <a:bodyPr/>
-          <a:lstStyle/>
-          <a:p>
-            <a:pPr lvl="0" marL="0" indent="0">
-              <a:buNone/>
-            </a:pPr>
-            <a:r>
-              <a:rPr/>
-              <a:t>((Add visualization here))</a:t>
-            </a:r>
-          </a:p>
-        </p:txBody>
-      </p:sp>
+              <a:t>Trend</a:t>
+            </a:r>
+            <a:r>
+              <a:rPr/>
+              <a:t> </a:t>
+            </a:r>
+            <a:r>
+              <a:rPr/>
+              <a:t>lines</a:t>
+            </a:r>
+            <a:r>
+              <a:rPr/>
+              <a:t> </a:t>
+            </a:r>
+            <a:r>
+              <a:rPr/>
+              <a:t>(linear)</a:t>
+            </a:r>
+          </a:p>
+        </p:txBody>
+      </p:sp>
+      <p:pic>
+        <p:nvPicPr>
+          <p:cNvPr descr="../images/linear-trend-age.png" id="0" name="Picture 1"/>
+          <p:cNvPicPr>
+            <a:picLocks noGrp="1" noChangeAspect="1"/>
+          </p:cNvPicPr>
+          <p:nvPr/>
+        </p:nvPicPr>
+        <p:blipFill>
+          <a:blip r:embed="rId2"/>
+          <a:stretch>
+            <a:fillRect/>
+          </a:stretch>
+        </p:blipFill>
+        <p:spPr bwMode="auto">
+          <a:xfrm>
+            <a:off x="2311400" y="1600200"/>
+            <a:ext cx="4521200" cy="4521200"/>
+          </a:xfrm>
+          <a:prstGeom prst="rect">
+            <a:avLst/>
+          </a:prstGeom>
+          <a:noFill/>
+          <a:ln w="9525">
+            <a:noFill/>
+            <a:headEnd/>
+            <a:tailEnd/>
+          </a:ln>
+        </p:spPr>
+      </p:pic>
     </p:spTree>
   </p:cSld>
 </p:sld>
@@ -7483,36 +7911,57 @@
             </a:pPr>
             <a:r>
               <a:rPr/>
-              <a:t>Boxplots</a:t>
-            </a:r>
-          </a:p>
-        </p:txBody>
-      </p:sp>
-      <p:sp>
-        <p:nvSpPr>
-          <p:cNvPr id="3" name="Content Placeholder 2"/>
-          <p:cNvSpPr>
-            <a:spLocks noGrp="1"/>
-          </p:cNvSpPr>
-          <p:nvPr>
-            <p:ph idx="1"/>
-          </p:nvPr>
-        </p:nvSpPr>
-        <p:spPr/>
-        <p:txBody>
-          <a:bodyPr/>
-          <a:lstStyle/>
-          <a:p>
-            <a:pPr lvl="0" marL="0" indent="0">
-              <a:buNone/>
-            </a:pPr>
-            <a:r>
-              <a:rPr/>
-              <a:t>((Draw example and ask students to do a similar example))</a:t>
-            </a:r>
-          </a:p>
-        </p:txBody>
-      </p:sp>
+              <a:t>Trend</a:t>
+            </a:r>
+            <a:r>
+              <a:rPr/>
+              <a:t> </a:t>
+            </a:r>
+            <a:r>
+              <a:rPr/>
+              <a:t>lines</a:t>
+            </a:r>
+            <a:r>
+              <a:rPr/>
+              <a:t> </a:t>
+            </a:r>
+            <a:r>
+              <a:rPr/>
+              <a:t>(spline)</a:t>
+            </a:r>
+          </a:p>
+        </p:txBody>
+      </p:sp>
+      <p:pic>
+        <p:nvPicPr>
+          <p:cNvPr descr="../images/smooth-trend.png" id="0" name="Picture 1"/>
+          <p:cNvPicPr>
+            <a:picLocks noGrp="1" noChangeAspect="1"/>
+          </p:cNvPicPr>
+          <p:nvPr/>
+        </p:nvPicPr>
+        <p:blipFill>
+          <a:blip r:embed="rId2"/>
+          <a:stretch>
+            <a:fillRect/>
+          </a:stretch>
+        </p:blipFill>
+        <p:spPr bwMode="auto">
+          <a:xfrm>
+            <a:off x="2311400" y="1600200"/>
+            <a:ext cx="4521200" cy="4521200"/>
+          </a:xfrm>
+          <a:prstGeom prst="rect">
+            <a:avLst/>
+          </a:prstGeom>
+          <a:noFill/>
+          <a:ln w="9525">
+            <a:noFill/>
+            <a:headEnd/>
+            <a:tailEnd/>
+          </a:ln>
+        </p:spPr>
+      </p:pic>
     </p:spTree>
   </p:cSld>
 </p:sld>
@@ -7571,14 +8020,38 @@
             </a:r>
             <a:r>
               <a:rPr/>
-              <a:t>(linear)</a:t>
+              <a:t>(spline),</a:t>
+            </a:r>
+            <a:r>
+              <a:rPr/>
+              <a:t> </a:t>
+            </a:r>
+            <a:r>
+              <a:rPr/>
+              <a:t>not</a:t>
+            </a:r>
+            <a:r>
+              <a:rPr/>
+              <a:t> </a:t>
+            </a:r>
+            <a:r>
+              <a:rPr/>
+              <a:t>so</a:t>
+            </a:r>
+            <a:r>
+              <a:rPr/>
+              <a:t> </a:t>
+            </a:r>
+            <a:r>
+              <a:rPr/>
+              <a:t>smooth</a:t>
             </a:r>
           </a:p>
         </p:txBody>
       </p:sp>
       <p:pic>
         <p:nvPicPr>
-          <p:cNvPr descr="data-visualization-03-lines_files/figure-pptx/linear-trend-age-1.png" id="0" name="Picture 1"/>
+          <p:cNvPr descr="../images/smooth-trend-3.png" id="0" name="Picture 1"/>
           <p:cNvPicPr>
             <a:picLocks noGrp="1" noChangeAspect="1"/>
           </p:cNvPicPr>
@@ -7592,8 +8065,8 @@
         </p:blipFill>
         <p:spPr bwMode="auto">
           <a:xfrm>
-            <a:off x="1752600" y="1600200"/>
-            <a:ext cx="5651500" cy="4521200"/>
+            <a:off x="2311400" y="1600200"/>
+            <a:ext cx="4521200" cy="4521200"/>
           </a:xfrm>
           <a:prstGeom prst="rect">
             <a:avLst/>
@@ -7648,57 +8121,57 @@
             </a:pPr>
             <a:r>
               <a:rPr/>
-              <a:t>Trend</a:t>
-            </a:r>
-            <a:r>
-              <a:rPr/>
-              <a:t> </a:t>
-            </a:r>
-            <a:r>
-              <a:rPr/>
-              <a:t>lines</a:t>
-            </a:r>
-            <a:r>
-              <a:rPr/>
-              <a:t> </a:t>
-            </a:r>
-            <a:r>
-              <a:rPr/>
-              <a:t>(spline)</a:t>
-            </a:r>
-          </a:p>
-        </p:txBody>
-      </p:sp>
-      <p:pic>
-        <p:nvPicPr>
-          <p:cNvPr descr="data-visualization-03-lines_files/figure-pptx/smooth-trend-1.png" id="0" name="Picture 1"/>
-          <p:cNvPicPr>
-            <a:picLocks noGrp="1" noChangeAspect="1"/>
-          </p:cNvPicPr>
-          <p:nvPr/>
-        </p:nvPicPr>
-        <p:blipFill>
-          <a:blip r:embed="rId2"/>
-          <a:stretch>
-            <a:fillRect/>
-          </a:stretch>
-        </p:blipFill>
-        <p:spPr bwMode="auto">
-          <a:xfrm>
-            <a:off x="1752600" y="1600200"/>
-            <a:ext cx="5651500" cy="4521200"/>
-          </a:xfrm>
-          <a:prstGeom prst="rect">
-            <a:avLst/>
-          </a:prstGeom>
-          <a:noFill/>
-          <a:ln w="9525">
-            <a:noFill/>
-            <a:headEnd/>
-            <a:tailEnd/>
-          </a:ln>
-        </p:spPr>
-      </p:pic>
+              <a:t>On</a:t>
+            </a:r>
+            <a:r>
+              <a:rPr/>
+              <a:t> </a:t>
+            </a:r>
+            <a:r>
+              <a:rPr/>
+              <a:t>your</a:t>
+            </a:r>
+            <a:r>
+              <a:rPr/>
+              <a:t> </a:t>
+            </a:r>
+            <a:r>
+              <a:rPr/>
+              <a:t>own</a:t>
+            </a:r>
+          </a:p>
+        </p:txBody>
+      </p:sp>
+      <p:sp>
+        <p:nvSpPr>
+          <p:cNvPr id="3" name="Content Placeholder 2"/>
+          <p:cNvSpPr>
+            <a:spLocks noGrp="1"/>
+          </p:cNvSpPr>
+          <p:nvPr>
+            <p:ph idx="1"/>
+          </p:nvPr>
+        </p:nvSpPr>
+        <p:spPr/>
+        <p:txBody>
+          <a:bodyPr/>
+          <a:lstStyle/>
+          <a:p>
+            <a:pPr lvl="1"/>
+            <a:r>
+              <a:rPr/>
+              <a:t>Fit a linear trend line looking at Living.Area versus Price.</a:t>
+            </a:r>
+          </a:p>
+          <a:p>
+            <a:pPr lvl="1"/>
+            <a:r>
+              <a:rPr/>
+              <a:t>Fit a smooth curve</a:t>
+            </a:r>
+          </a:p>
+        </p:txBody>
+      </p:sp>
     </p:spTree>
   </p:cSld>
 </p:sld>
@@ -7723,12 +8196,12 @@
       </p:grpSpPr>
       <p:sp>
         <p:nvSpPr>
-          <p:cNvPr id="3" name="Content Placeholder 2"/>
-          <p:cNvSpPr>
-            <a:spLocks noGrp="1"/>
-          </p:cNvSpPr>
-          <p:nvPr>
-            <p:ph idx="1"/>
+          <p:cNvPr id="2" name="Title 1"/>
+          <p:cNvSpPr>
+            <a:spLocks noGrp="1"/>
+          </p:cNvSpPr>
+          <p:nvPr>
+            <p:ph type="title"/>
           </p:nvPr>
         </p:nvSpPr>
         <p:spPr/>
@@ -7741,7 +8214,23 @@
             </a:pPr>
             <a:r>
               <a:rPr/>
-              <a:t> ### Trend lines (spline), not so smooth</a:t>
+              <a:t>Wait</a:t>
+            </a:r>
+            <a:r>
+              <a:rPr/>
+              <a:t> </a:t>
+            </a:r>
+            <a:r>
+              <a:rPr/>
+              <a:t>before</a:t>
+            </a:r>
+            <a:r>
+              <a:rPr/>
+              <a:t> </a:t>
+            </a:r>
+            <a:r>
+              <a:rPr/>
+              <a:t>showing</a:t>
             </a:r>
           </a:p>
         </p:txBody>
@@ -7768,9 +8257,74 @@
           <a:chExt cx="0" cy="0"/>
         </a:xfrm>
       </p:grpSpPr>
+      <p:sp>
+        <p:nvSpPr>
+          <p:cNvPr id="2" name="Title 1"/>
+          <p:cNvSpPr>
+            <a:spLocks noGrp="1"/>
+          </p:cNvSpPr>
+          <p:nvPr>
+            <p:ph type="title"/>
+          </p:nvPr>
+        </p:nvSpPr>
+        <p:spPr/>
+        <p:txBody>
+          <a:bodyPr/>
+          <a:lstStyle/>
+          <a:p>
+            <a:pPr lvl="0" marL="0" indent="0">
+              <a:buNone/>
+            </a:pPr>
+            <a:r>
+              <a:rPr/>
+              <a:t>What</a:t>
+            </a:r>
+            <a:r>
+              <a:rPr/>
+              <a:t> </a:t>
+            </a:r>
+            <a:r>
+              <a:rPr/>
+              <a:t>your</a:t>
+            </a:r>
+            <a:r>
+              <a:rPr/>
+              <a:t> </a:t>
+            </a:r>
+            <a:r>
+              <a:rPr/>
+              <a:t>visualization</a:t>
+            </a:r>
+            <a:r>
+              <a:rPr/>
+              <a:t> </a:t>
+            </a:r>
+            <a:r>
+              <a:rPr/>
+              <a:t>might</a:t>
+            </a:r>
+            <a:r>
+              <a:rPr/>
+              <a:t> </a:t>
+            </a:r>
+            <a:r>
+              <a:rPr/>
+              <a:t>look</a:t>
+            </a:r>
+            <a:r>
+              <a:rPr/>
+              <a:t> </a:t>
+            </a:r>
+            <a:r>
+              <a:rPr/>
+              <a:t>like</a:t>
+            </a:r>
+          </a:p>
+        </p:txBody>
+      </p:sp>
       <p:pic>
         <p:nvPicPr>
-          <p:cNvPr descr="data-visualization-03-lines_files/figure-pptx/smooth-trend-3-1.png" id="0" name="Picture 1"/>
+          <p:cNvPr descr="../images/living-area-lm.png" id="0" name="Picture 1"/>
           <p:cNvPicPr>
             <a:picLocks noGrp="1" noChangeAspect="1"/>
           </p:cNvPicPr>
@@ -7784,8 +8338,8 @@
         </p:blipFill>
         <p:spPr bwMode="auto">
           <a:xfrm>
-            <a:off x="1752600" y="1600200"/>
-            <a:ext cx="5651500" cy="4521200"/>
+            <a:off x="2311400" y="1600200"/>
+            <a:ext cx="4521200" cy="4521200"/>
           </a:xfrm>
           <a:prstGeom prst="rect">
             <a:avLst/>
@@ -7944,7 +8498,7 @@
             </a:pPr>
             <a:r>
               <a:rPr/>
-              <a:t>On</a:t>
+              <a:t>What</a:t>
             </a:r>
             <a:r>
               <a:rPr/>
@@ -7960,37 +8514,31 @@
             </a:r>
             <a:r>
               <a:rPr/>
-              <a:t>own</a:t>
-            </a:r>
-          </a:p>
-        </p:txBody>
-      </p:sp>
-      <p:sp>
-        <p:nvSpPr>
-          <p:cNvPr id="3" name="Content Placeholder 2"/>
-          <p:cNvSpPr>
-            <a:spLocks noGrp="1"/>
-          </p:cNvSpPr>
-          <p:nvPr>
-            <p:ph idx="1"/>
-          </p:nvPr>
-        </p:nvSpPr>
-        <p:spPr/>
-        <p:txBody>
-          <a:bodyPr/>
-          <a:lstStyle/>
-          <a:p>
-            <a:pPr lvl="1"/>
-            <a:r>
-              <a:rPr/>
-              <a:t>Fit a linear trend line looking at Living.Area versus Price.</a:t>
-            </a:r>
-          </a:p>
-          <a:p>
-            <a:pPr lvl="1"/>
-            <a:r>
-              <a:rPr/>
-              <a:t>Fit a smooth curve</a:t>
+              <a:t>visualization</a:t>
+            </a:r>
+            <a:r>
+              <a:rPr/>
+              <a:t> </a:t>
+            </a:r>
+            <a:r>
+              <a:rPr/>
+              <a:t>might</a:t>
+            </a:r>
+            <a:r>
+              <a:rPr/>
+              <a:t> </a:t>
+            </a:r>
+            <a:r>
+              <a:rPr/>
+              <a:t>look</a:t>
+            </a:r>
+            <a:r>
+              <a:rPr/>
+              <a:t> </a:t>
+            </a:r>
+            <a:r>
+              <a:rPr/>
+              <a:t>like</a:t>
             </a:r>
           </a:p>
         </p:txBody>
@@ -8037,23 +8585,48 @@
             </a:pPr>
             <a:r>
               <a:rPr/>
-              <a:t>Wait</a:t>
-            </a:r>
-            <a:r>
-              <a:rPr/>
-              <a:t> </a:t>
-            </a:r>
-            <a:r>
-              <a:rPr/>
-              <a:t>before</a:t>
-            </a:r>
-            <a:r>
-              <a:rPr/>
-              <a:t> </a:t>
-            </a:r>
-            <a:r>
-              <a:rPr/>
-              <a:t>showing</a:t>
+              <a:t>Trend</a:t>
+            </a:r>
+            <a:r>
+              <a:rPr/>
+              <a:t> </a:t>
+            </a:r>
+            <a:r>
+              <a:rPr/>
+              <a:t>lines</a:t>
+            </a:r>
+            <a:r>
+              <a:rPr/>
+              <a:t> </a:t>
+            </a:r>
+            <a:r>
+              <a:rPr/>
+              <a:t>(logistic)</a:t>
+            </a:r>
+          </a:p>
+        </p:txBody>
+      </p:sp>
+      <p:sp>
+        <p:nvSpPr>
+          <p:cNvPr id="3" name="Content Placeholder 2"/>
+          <p:cNvSpPr>
+            <a:spLocks noGrp="1"/>
+          </p:cNvSpPr>
+          <p:nvPr>
+            <p:ph idx="1"/>
+          </p:nvPr>
+        </p:nvSpPr>
+        <p:spPr/>
+        <p:txBody>
+          <a:bodyPr/>
+          <a:lstStyle/>
+          <a:p>
+            <a:pPr lvl="0" marL="0" indent="0">
+              <a:buNone/>
+            </a:pPr>
+            <a:r>
+              <a:rPr/>
+              <a:t>((Need a different data set here. Titanic???))</a:t>
             </a:r>
           </a:p>
         </p:txBody>
@@ -8100,81 +8673,44 @@
             </a:pPr>
             <a:r>
               <a:rPr/>
-              <a:t>What</a:t>
-            </a:r>
-            <a:r>
-              <a:rPr/>
-              <a:t> </a:t>
-            </a:r>
-            <a:r>
-              <a:rPr/>
-              <a:t>your</a:t>
-            </a:r>
-            <a:r>
-              <a:rPr/>
-              <a:t> </a:t>
-            </a:r>
-            <a:r>
-              <a:rPr/>
-              <a:t>visualization</a:t>
-            </a:r>
-            <a:r>
-              <a:rPr/>
-              <a:t> </a:t>
-            </a:r>
-            <a:r>
-              <a:rPr/>
-              <a:t>might</a:t>
-            </a:r>
-            <a:r>
-              <a:rPr/>
-              <a:t> </a:t>
-            </a:r>
-            <a:r>
-              <a:rPr/>
-              <a:t>look</a:t>
-            </a:r>
-            <a:r>
-              <a:rPr/>
-              <a:t> </a:t>
-            </a:r>
-            <a:r>
-              <a:rPr/>
-              <a:t>like</a:t>
-            </a:r>
-          </a:p>
-        </p:txBody>
-      </p:sp>
-      <p:pic>
-        <p:nvPicPr>
-          <p:cNvPr descr="data-visualization-03-lines_files/figure-pptx/living-area-lm-1.png" id="0" name="Picture 1"/>
-          <p:cNvPicPr>
-            <a:picLocks noGrp="1" noChangeAspect="1"/>
-          </p:cNvPicPr>
-          <p:nvPr/>
-        </p:nvPicPr>
-        <p:blipFill>
-          <a:blip r:embed="rId2"/>
-          <a:stretch>
-            <a:fillRect/>
-          </a:stretch>
-        </p:blipFill>
-        <p:spPr bwMode="auto">
-          <a:xfrm>
-            <a:off x="1752600" y="1600200"/>
-            <a:ext cx="5651500" cy="4521200"/>
-          </a:xfrm>
-          <a:prstGeom prst="rect">
-            <a:avLst/>
-          </a:prstGeom>
-          <a:noFill/>
-          <a:ln w="9525">
-            <a:noFill/>
-            <a:headEnd/>
-            <a:tailEnd/>
-          </a:ln>
-        </p:spPr>
-      </p:pic>
+              <a:t>Helpful</a:t>
+            </a:r>
+            <a:r>
+              <a:rPr/>
+              <a:t> </a:t>
+            </a:r>
+            <a:r>
+              <a:rPr/>
+              <a:t>tips</a:t>
+            </a:r>
+          </a:p>
+        </p:txBody>
+      </p:sp>
+      <p:sp>
+        <p:nvSpPr>
+          <p:cNvPr id="3" name="Content Placeholder 2"/>
+          <p:cNvSpPr>
+            <a:spLocks noGrp="1"/>
+          </p:cNvSpPr>
+          <p:nvPr>
+            <p:ph idx="1"/>
+          </p:nvPr>
+        </p:nvSpPr>
+        <p:spPr/>
+        <p:txBody>
+          <a:bodyPr/>
+          <a:lstStyle/>
+          <a:p>
+            <a:pPr lvl="0" marL="0" indent="0">
+              <a:buNone/>
+            </a:pPr>
+            <a:r>
+              <a:rPr/>
+              <a:t>((Add three or four slides here. Maybe talk about opacity.))</a:t>
+            </a:r>
+          </a:p>
+        </p:txBody>
+      </p:sp>
     </p:spTree>
   </p:cSld>
 </p:sld>
@@ -8217,81 +8753,65 @@
             </a:pPr>
             <a:r>
               <a:rPr/>
-              <a:t>What</a:t>
-            </a:r>
-            <a:r>
-              <a:rPr/>
-              <a:t> </a:t>
-            </a:r>
-            <a:r>
-              <a:rPr/>
-              <a:t>your</a:t>
-            </a:r>
-            <a:r>
-              <a:rPr/>
-              <a:t> </a:t>
-            </a:r>
-            <a:r>
-              <a:rPr/>
-              <a:t>visualization</a:t>
-            </a:r>
-            <a:r>
-              <a:rPr/>
-              <a:t> </a:t>
-            </a:r>
-            <a:r>
-              <a:rPr/>
-              <a:t>might</a:t>
-            </a:r>
-            <a:r>
-              <a:rPr/>
-              <a:t> </a:t>
-            </a:r>
-            <a:r>
-              <a:rPr/>
-              <a:t>look</a:t>
-            </a:r>
-            <a:r>
-              <a:rPr/>
-              <a:t> </a:t>
-            </a:r>
-            <a:r>
-              <a:rPr/>
-              <a:t>like</a:t>
-            </a:r>
-          </a:p>
-        </p:txBody>
-      </p:sp>
-      <p:pic>
-        <p:nvPicPr>
-          <p:cNvPr descr="data-visualization-03-lines_files/figure-pptx/living-area-loess-1.png" id="0" name="Picture 1"/>
-          <p:cNvPicPr>
-            <a:picLocks noGrp="1" noChangeAspect="1"/>
-          </p:cNvPicPr>
-          <p:nvPr/>
-        </p:nvPicPr>
-        <p:blipFill>
-          <a:blip r:embed="rId2"/>
-          <a:stretch>
-            <a:fillRect/>
-          </a:stretch>
-        </p:blipFill>
-        <p:spPr bwMode="auto">
-          <a:xfrm>
-            <a:off x="1752600" y="1600200"/>
-            <a:ext cx="5651500" cy="4521200"/>
-          </a:xfrm>
-          <a:prstGeom prst="rect">
-            <a:avLst/>
-          </a:prstGeom>
-          <a:noFill/>
-          <a:ln w="9525">
-            <a:noFill/>
-            <a:headEnd/>
-            <a:tailEnd/>
-          </a:ln>
-        </p:spPr>
-      </p:pic>
+              <a:t>Group</a:t>
+            </a:r>
+            <a:r>
+              <a:rPr/>
+              <a:t> </a:t>
+            </a:r>
+            <a:r>
+              <a:rPr/>
+              <a:t>exercise</a:t>
+            </a:r>
+          </a:p>
+        </p:txBody>
+      </p:sp>
+      <p:sp>
+        <p:nvSpPr>
+          <p:cNvPr id="3" name="Content Placeholder 2"/>
+          <p:cNvSpPr>
+            <a:spLocks noGrp="1"/>
+          </p:cNvSpPr>
+          <p:nvPr>
+            <p:ph idx="1"/>
+          </p:nvPr>
+        </p:nvSpPr>
+        <p:spPr/>
+        <p:txBody>
+          <a:bodyPr/>
+          <a:lstStyle/>
+          <a:p>
+            <a:pPr lvl="1"/>
+            <a:r>
+              <a:rPr/>
+              <a:t>Review the following visualization in your group.</a:t>
+            </a:r>
+          </a:p>
+          <a:p>
+            <a:pPr lvl="2"/>
+            <a:r>
+              <a:rPr/>
+              <a:t>Summarize what aesthetics (location, size, shape, color) appear in the graph</a:t>
+            </a:r>
+          </a:p>
+          <a:p>
+            <a:pPr lvl="2"/>
+            <a:r>
+              <a:rPr/>
+              <a:t>What variables map to each aesthetic?</a:t>
+            </a:r>
+          </a:p>
+          <a:p>
+            <a:pPr lvl="0" marL="0" indent="0">
+              <a:buNone/>
+            </a:pPr>
+            <a:r>
+              <a:rPr/>
+              <a:t>((Find new images or use the ones from earlier))</a:t>
+            </a:r>
+          </a:p>
+        </p:txBody>
+      </p:sp>
     </p:spTree>
   </p:cSld>
 </p:sld>
@@ -8334,23 +8854,31 @@
             </a:pPr>
             <a:r>
               <a:rPr/>
-              <a:t>Trend</a:t>
-            </a:r>
-            <a:r>
-              <a:rPr/>
-              <a:t> </a:t>
-            </a:r>
-            <a:r>
-              <a:rPr/>
-              <a:t>lines</a:t>
-            </a:r>
-            <a:r>
-              <a:rPr/>
-              <a:t> </a:t>
-            </a:r>
-            <a:r>
-              <a:rPr/>
-              <a:t>(logistic)</a:t>
+              <a:t>Summary</a:t>
+            </a:r>
+            <a:r>
+              <a:rPr/>
+              <a:t> </a:t>
+            </a:r>
+            <a:r>
+              <a:rPr/>
+              <a:t>(1</a:t>
+            </a:r>
+            <a:r>
+              <a:rPr/>
+              <a:t> </a:t>
+            </a:r>
+            <a:r>
+              <a:rPr/>
+              <a:t>of</a:t>
+            </a:r>
+            <a:r>
+              <a:rPr/>
+              <a:t> </a:t>
+            </a:r>
+            <a:r>
+              <a:rPr/>
+              <a:t>2)</a:t>
             </a:r>
           </a:p>
         </p:txBody>
@@ -8370,12 +8898,59 @@
           <a:bodyPr/>
           <a:lstStyle/>
           <a:p>
-            <a:pPr lvl="0" marL="0" indent="0">
-              <a:buNone/>
-            </a:pPr>
-            <a:r>
-              <a:rPr/>
-              <a:t>((Need a different data set here. Titanic???))</a:t>
+            <a:pPr lvl="1"/>
+            <a:r>
+              <a:rPr/>
+              <a:t>Gestalt principles</a:t>
+            </a:r>
+          </a:p>
+          <a:p>
+            <a:pPr lvl="2"/>
+            <a:r>
+              <a:rPr/>
+              <a:t>((List here))</a:t>
+            </a:r>
+          </a:p>
+          <a:p>
+            <a:pPr lvl="1"/>
+            <a:r>
+              <a:rPr/>
+              <a:t>Aesthetics for lines</a:t>
+            </a:r>
+          </a:p>
+          <a:p>
+            <a:pPr lvl="2"/>
+            <a:r>
+              <a:rPr/>
+              <a:t>Size, Shape, Color</a:t>
+            </a:r>
+          </a:p>
+          <a:p>
+            <a:pPr lvl="1"/>
+            <a:r>
+              <a:rPr/>
+              <a:t>Lines as summary statistics</a:t>
+            </a:r>
+          </a:p>
+          <a:p>
+            <a:pPr lvl="2"/>
+            <a:r>
+              <a:rPr/>
+              <a:t>One number summary (mean, total, count, percent)</a:t>
+            </a:r>
+          </a:p>
+          <a:p>
+            <a:pPr lvl="2"/>
+            <a:r>
+              <a:rPr/>
+              <a:t>Two number summary (error bars)</a:t>
+            </a:r>
+          </a:p>
+          <a:p>
+            <a:pPr lvl="2"/>
+            <a:r>
+              <a:rPr/>
+              <a:t>Five number summary (boxplots)</a:t>
             </a:r>
           </a:p>
         </p:txBody>
@@ -8422,330 +8997,6 @@
             </a:pPr>
             <a:r>
               <a:rPr/>
-              <a:t>Helpful</a:t>
-            </a:r>
-            <a:r>
-              <a:rPr/>
-              <a:t> </a:t>
-            </a:r>
-            <a:r>
-              <a:rPr/>
-              <a:t>tips</a:t>
-            </a:r>
-          </a:p>
-        </p:txBody>
-      </p:sp>
-      <p:sp>
-        <p:nvSpPr>
-          <p:cNvPr id="3" name="Content Placeholder 2"/>
-          <p:cNvSpPr>
-            <a:spLocks noGrp="1"/>
-          </p:cNvSpPr>
-          <p:nvPr>
-            <p:ph idx="1"/>
-          </p:nvPr>
-        </p:nvSpPr>
-        <p:spPr/>
-        <p:txBody>
-          <a:bodyPr/>
-          <a:lstStyle/>
-          <a:p>
-            <a:pPr lvl="0" marL="0" indent="0">
-              <a:buNone/>
-            </a:pPr>
-            <a:r>
-              <a:rPr/>
-              <a:t>((Add three or four slides here. Maybe talk about opacity.))</a:t>
-            </a:r>
-          </a:p>
-        </p:txBody>
-      </p:sp>
-    </p:spTree>
-  </p:cSld>
-</p:sld>
-</file>
-
-<file path=ppt/slides/slide46.xml><?xml version="1.0" encoding="utf-8"?>
-<p:sld xmlns:a="http://schemas.openxmlformats.org/drawingml/2006/main" xmlns:r="http://schemas.openxmlformats.org/officeDocument/2006/relationships" xmlns:p="http://schemas.openxmlformats.org/presentationml/2006/main">
-  <p:cSld>
-    <p:spTree>
-      <p:nvGrpSpPr>
-        <p:cNvPr id="1" name=""/>
-        <p:cNvGrpSpPr/>
-        <p:nvPr/>
-      </p:nvGrpSpPr>
-      <p:grpSpPr>
-        <a:xfrm>
-          <a:off x="0" y="0"/>
-          <a:ext cx="0" cy="0"/>
-          <a:chOff x="0" y="0"/>
-          <a:chExt cx="0" cy="0"/>
-        </a:xfrm>
-      </p:grpSpPr>
-      <p:sp>
-        <p:nvSpPr>
-          <p:cNvPr id="2" name="Title 1"/>
-          <p:cNvSpPr>
-            <a:spLocks noGrp="1"/>
-          </p:cNvSpPr>
-          <p:nvPr>
-            <p:ph type="title"/>
-          </p:nvPr>
-        </p:nvSpPr>
-        <p:spPr/>
-        <p:txBody>
-          <a:bodyPr/>
-          <a:lstStyle/>
-          <a:p>
-            <a:pPr lvl="0" marL="0" indent="0">
-              <a:buNone/>
-            </a:pPr>
-            <a:r>
-              <a:rPr/>
-              <a:t>Group</a:t>
-            </a:r>
-            <a:r>
-              <a:rPr/>
-              <a:t> </a:t>
-            </a:r>
-            <a:r>
-              <a:rPr/>
-              <a:t>exercise</a:t>
-            </a:r>
-          </a:p>
-        </p:txBody>
-      </p:sp>
-      <p:sp>
-        <p:nvSpPr>
-          <p:cNvPr id="3" name="Content Placeholder 2"/>
-          <p:cNvSpPr>
-            <a:spLocks noGrp="1"/>
-          </p:cNvSpPr>
-          <p:nvPr>
-            <p:ph idx="1"/>
-          </p:nvPr>
-        </p:nvSpPr>
-        <p:spPr/>
-        <p:txBody>
-          <a:bodyPr/>
-          <a:lstStyle/>
-          <a:p>
-            <a:pPr lvl="1"/>
-            <a:r>
-              <a:rPr/>
-              <a:t>Review the following visualization in your group.</a:t>
-            </a:r>
-          </a:p>
-          <a:p>
-            <a:pPr lvl="2"/>
-            <a:r>
-              <a:rPr/>
-              <a:t>Summarize what aesthetics (location, size, shape, color) appear in the graph</a:t>
-            </a:r>
-          </a:p>
-          <a:p>
-            <a:pPr lvl="2"/>
-            <a:r>
-              <a:rPr/>
-              <a:t>What variables map to each aesthetic?</a:t>
-            </a:r>
-          </a:p>
-          <a:p>
-            <a:pPr lvl="0" marL="0" indent="0">
-              <a:buNone/>
-            </a:pPr>
-            <a:r>
-              <a:rPr/>
-              <a:t>((Find new images or use the ones from earlier))</a:t>
-            </a:r>
-          </a:p>
-        </p:txBody>
-      </p:sp>
-    </p:spTree>
-  </p:cSld>
-</p:sld>
-</file>
-
-<file path=ppt/slides/slide47.xml><?xml version="1.0" encoding="utf-8"?>
-<p:sld xmlns:a="http://schemas.openxmlformats.org/drawingml/2006/main" xmlns:r="http://schemas.openxmlformats.org/officeDocument/2006/relationships" xmlns:p="http://schemas.openxmlformats.org/presentationml/2006/main">
-  <p:cSld>
-    <p:spTree>
-      <p:nvGrpSpPr>
-        <p:cNvPr id="1" name=""/>
-        <p:cNvGrpSpPr/>
-        <p:nvPr/>
-      </p:nvGrpSpPr>
-      <p:grpSpPr>
-        <a:xfrm>
-          <a:off x="0" y="0"/>
-          <a:ext cx="0" cy="0"/>
-          <a:chOff x="0" y="0"/>
-          <a:chExt cx="0" cy="0"/>
-        </a:xfrm>
-      </p:grpSpPr>
-      <p:sp>
-        <p:nvSpPr>
-          <p:cNvPr id="2" name="Title 1"/>
-          <p:cNvSpPr>
-            <a:spLocks noGrp="1"/>
-          </p:cNvSpPr>
-          <p:nvPr>
-            <p:ph type="title"/>
-          </p:nvPr>
-        </p:nvSpPr>
-        <p:spPr/>
-        <p:txBody>
-          <a:bodyPr/>
-          <a:lstStyle/>
-          <a:p>
-            <a:pPr lvl="0" marL="0" indent="0">
-              <a:buNone/>
-            </a:pPr>
-            <a:r>
-              <a:rPr/>
-              <a:t>Summary</a:t>
-            </a:r>
-            <a:r>
-              <a:rPr/>
-              <a:t> </a:t>
-            </a:r>
-            <a:r>
-              <a:rPr/>
-              <a:t>(1</a:t>
-            </a:r>
-            <a:r>
-              <a:rPr/>
-              <a:t> </a:t>
-            </a:r>
-            <a:r>
-              <a:rPr/>
-              <a:t>of</a:t>
-            </a:r>
-            <a:r>
-              <a:rPr/>
-              <a:t> </a:t>
-            </a:r>
-            <a:r>
-              <a:rPr/>
-              <a:t>2)</a:t>
-            </a:r>
-          </a:p>
-        </p:txBody>
-      </p:sp>
-      <p:sp>
-        <p:nvSpPr>
-          <p:cNvPr id="3" name="Content Placeholder 2"/>
-          <p:cNvSpPr>
-            <a:spLocks noGrp="1"/>
-          </p:cNvSpPr>
-          <p:nvPr>
-            <p:ph idx="1"/>
-          </p:nvPr>
-        </p:nvSpPr>
-        <p:spPr/>
-        <p:txBody>
-          <a:bodyPr/>
-          <a:lstStyle/>
-          <a:p>
-            <a:pPr lvl="1"/>
-            <a:r>
-              <a:rPr/>
-              <a:t>Gestalt principles</a:t>
-            </a:r>
-          </a:p>
-          <a:p>
-            <a:pPr lvl="2"/>
-            <a:r>
-              <a:rPr/>
-              <a:t>((List here))</a:t>
-            </a:r>
-          </a:p>
-          <a:p>
-            <a:pPr lvl="1"/>
-            <a:r>
-              <a:rPr/>
-              <a:t>Aesthetics for lines</a:t>
-            </a:r>
-          </a:p>
-          <a:p>
-            <a:pPr lvl="2"/>
-            <a:r>
-              <a:rPr/>
-              <a:t>Size, Shape, Color</a:t>
-            </a:r>
-          </a:p>
-          <a:p>
-            <a:pPr lvl="1"/>
-            <a:r>
-              <a:rPr/>
-              <a:t>Lines as summary statistics</a:t>
-            </a:r>
-          </a:p>
-          <a:p>
-            <a:pPr lvl="2"/>
-            <a:r>
-              <a:rPr/>
-              <a:t>One number summary (mean, total, count, percent)</a:t>
-            </a:r>
-          </a:p>
-          <a:p>
-            <a:pPr lvl="2"/>
-            <a:r>
-              <a:rPr/>
-              <a:t>Two number summary (error bars)</a:t>
-            </a:r>
-          </a:p>
-          <a:p>
-            <a:pPr lvl="2"/>
-            <a:r>
-              <a:rPr/>
-              <a:t>Five number summary (boxplots)</a:t>
-            </a:r>
-          </a:p>
-        </p:txBody>
-      </p:sp>
-    </p:spTree>
-  </p:cSld>
-</p:sld>
-</file>
-
-<file path=ppt/slides/slide48.xml><?xml version="1.0" encoding="utf-8"?>
-<p:sld xmlns:a="http://schemas.openxmlformats.org/drawingml/2006/main" xmlns:r="http://schemas.openxmlformats.org/officeDocument/2006/relationships" xmlns:p="http://schemas.openxmlformats.org/presentationml/2006/main">
-  <p:cSld>
-    <p:spTree>
-      <p:nvGrpSpPr>
-        <p:cNvPr id="1" name=""/>
-        <p:cNvGrpSpPr/>
-        <p:nvPr/>
-      </p:nvGrpSpPr>
-      <p:grpSpPr>
-        <a:xfrm>
-          <a:off x="0" y="0"/>
-          <a:ext cx="0" cy="0"/>
-          <a:chOff x="0" y="0"/>
-          <a:chExt cx="0" cy="0"/>
-        </a:xfrm>
-      </p:grpSpPr>
-      <p:sp>
-        <p:nvSpPr>
-          <p:cNvPr id="2" name="Title 1"/>
-          <p:cNvSpPr>
-            <a:spLocks noGrp="1"/>
-          </p:cNvSpPr>
-          <p:nvPr>
-            <p:ph type="title"/>
-          </p:nvPr>
-        </p:nvSpPr>
-        <p:spPr/>
-        <p:txBody>
-          <a:bodyPr/>
-          <a:lstStyle/>
-          <a:p>
-            <a:pPr lvl="0" marL="0" indent="0">
-              <a:buNone/>
-            </a:pPr>
-            <a:r>
-              <a:rPr/>
               <a:t>Summary</a:t>
             </a:r>
             <a:r>
@@ -9058,7 +9309,7 @@
       </p:sp>
       <p:pic>
         <p:nvPicPr>
-          <p:cNvPr descr="../images/03/baseball-line-graph.png" id="0" name="Picture 1"/>
+          <p:cNvPr descr="../images/baseball-line-graph.png" id="0" name="Picture 1"/>
           <p:cNvPicPr>
             <a:picLocks noGrp="1" noChangeAspect="1"/>
           </p:cNvPicPr>
@@ -9251,27 +9502,94 @@
           </a:p>
         </p:txBody>
       </p:sp>
-      <p:sp>
-        <p:nvSpPr>
-          <p:cNvPr id="3" name="Content Placeholder 2"/>
-          <p:cNvSpPr>
-            <a:spLocks noGrp="1"/>
-          </p:cNvSpPr>
-          <p:nvPr>
-            <p:ph idx="1"/>
-          </p:nvPr>
-        </p:nvSpPr>
-        <p:spPr/>
-        <p:txBody>
-          <a:bodyPr/>
-          <a:lstStyle/>
-          <a:p>
-            <a:pPr lvl="0" marL="0" indent="0">
+      <p:pic>
+        <p:nvPicPr>
+          <p:cNvPr descr="../images/technology-trends.png" id="0" name="Picture 1"/>
+          <p:cNvPicPr>
+            <a:picLocks noGrp="1" noChangeAspect="1"/>
+          </p:cNvPicPr>
+          <p:nvPr/>
+        </p:nvPicPr>
+        <p:blipFill>
+          <a:blip r:embed="rId3"/>
+          <a:stretch>
+            <a:fillRect/>
+          </a:stretch>
+        </p:blipFill>
+        <p:spPr bwMode="auto">
+          <a:xfrm>
+            <a:off x="1320800" y="1600200"/>
+            <a:ext cx="6502400" cy="4013200"/>
+          </a:xfrm>
+          <a:prstGeom prst="rect">
+            <a:avLst/>
+          </a:prstGeom>
+          <a:noFill/>
+          <a:ln w="9525">
+            <a:noFill/>
+            <a:headEnd/>
+            <a:tailEnd/>
+          </a:ln>
+        </p:spPr>
+      </p:pic>
+      <p:sp>
+        <p:nvSpPr>
+          <p:cNvPr id="1" name="TextBox 3"/>
+          <p:cNvSpPr txBox="1"/>
+          <p:nvPr/>
+        </p:nvSpPr>
+        <p:spPr>
+          <a:xfrm>
+            <a:off x="457200" y="5613400"/>
+            <a:ext cx="8229600" cy="508000"/>
+          </a:xfrm>
+          <a:prstGeom prst="rect">
+            <a:avLst/>
+          </a:prstGeom>
+          <a:noFill/>
+        </p:spPr>
+        <p:txBody>
+          <a:bodyPr/>
+          <a:lstStyle/>
+          <a:p>
+            <a:pPr lvl="0" marL="0" indent="0" algn="ctr">
               <a:buNone/>
             </a:pPr>
             <a:r>
               <a:rPr/>
-              <a:t>((Find second news article and image))</a:t>
+              <a:t>Line</a:t>
+            </a:r>
+            <a:r>
+              <a:rPr/>
+              <a:t> </a:t>
+            </a:r>
+            <a:r>
+              <a:rPr/>
+              <a:t>graph</a:t>
+            </a:r>
+            <a:r>
+              <a:rPr/>
+              <a:t> </a:t>
+            </a:r>
+            <a:r>
+              <a:rPr/>
+              <a:t>of</a:t>
+            </a:r>
+            <a:r>
+              <a:rPr/>
+              <a:t> </a:t>
+            </a:r>
+            <a:r>
+              <a:rPr/>
+              <a:t>technology</a:t>
+            </a:r>
+            <a:r>
+              <a:rPr/>
+              <a:t> </a:t>
+            </a:r>
+            <a:r>
+              <a:rPr/>
+              <a:t>trends</a:t>
             </a:r>
           </a:p>
         </p:txBody>

</xml_diff>